<commit_message>
Update CodeMash Logo and 2nd Speaker Name
</commit_message>
<xml_diff>
--- a/00-Software Craftsmanship.pptx
+++ b/00-Software Craftsmanship.pptx
@@ -122,13 +122,18 @@
   </p:defaultTextStyle>
   <p:extLst>
     <p:ext uri="{EFAFB233-063F-42B5-8137-9DF3F51BA10A}">
-      <p15:sldGuideLst xmlns:p15="http://schemas.microsoft.com/office/powerpoint/2012/main" xmlns="">
+      <p15:sldGuideLst xmlns:p15="http://schemas.microsoft.com/office/powerpoint/2012/main">
         <p15:guide id="1" orient="horz" pos="2160">
           <p15:clr>
             <a:srgbClr val="A4A3A4"/>
           </p15:clr>
         </p15:guide>
         <p15:guide id="2" pos="2880">
+          <p15:clr>
+            <a:srgbClr val="A4A3A4"/>
+          </p15:clr>
+        </p15:guide>
+        <p15:guide id="3" orient="horz" pos="1620">
           <p15:clr>
             <a:srgbClr val="A4A3A4"/>
           </p15:clr>
@@ -222,7 +227,7 @@
             <a:fld id="{657F9423-C4A1-46DE-88F2-C85BC06777B4}" type="datetimeFigureOut">
               <a:rPr lang="en-US" smtClean="0"/>
               <a:pPr/>
-              <a:t>1/8/14</a:t>
+              <a:t>1/3/2015</a:t>
             </a:fld>
             <a:endParaRPr lang="en-US"/>
           </a:p>
@@ -548,7 +553,23 @@
             </a:r>
             <a:r>
               <a:rPr lang="en-US" baseline="0" dirty="0" smtClean="0"/>
-              <a:t> everyone fought through the hangovers to make it here bright and early in the morning. My name is Brendan Enrick and this is Steve Smith, and today we’re going to be talking about software craftsmanship. </a:t>
+              <a:t> everyone fought through the hangovers to make it here bright and early in the morning. My name is Brendan Enrick and this is </a:t>
+            </a:r>
+            <a:r>
+              <a:rPr lang="en-US" baseline="0" dirty="0" smtClean="0"/>
+              <a:t>Jeff </a:t>
+            </a:r>
+            <a:r>
+              <a:rPr lang="en-US" baseline="0" dirty="0" err="1" smtClean="0"/>
+              <a:t>Valore</a:t>
+            </a:r>
+            <a:r>
+              <a:rPr lang="en-US" baseline="0" dirty="0" smtClean="0"/>
+              <a:t>, </a:t>
+            </a:r>
+            <a:r>
+              <a:rPr lang="en-US" baseline="0" dirty="0" smtClean="0"/>
+              <a:t>and today we’re going to be talking about software craftsmanship. </a:t>
             </a:r>
           </a:p>
           <a:p>
@@ -1126,7 +1147,7 @@
             <a:fld id="{E729771A-EB65-4961-8DE3-A88B682D31B9}" type="datetimeFigureOut">
               <a:rPr lang="en-US" smtClean="0"/>
               <a:pPr/>
-              <a:t>1/8/14</a:t>
+              <a:t>1/3/2015</a:t>
             </a:fld>
             <a:endParaRPr lang="en-US"/>
           </a:p>
@@ -1298,7 +1319,7 @@
             <a:fld id="{E729771A-EB65-4961-8DE3-A88B682D31B9}" type="datetimeFigureOut">
               <a:rPr lang="en-US" smtClean="0"/>
               <a:pPr/>
-              <a:t>1/8/14</a:t>
+              <a:t>1/3/2015</a:t>
             </a:fld>
             <a:endParaRPr lang="en-US"/>
           </a:p>
@@ -1480,7 +1501,7 @@
             <a:fld id="{E729771A-EB65-4961-8DE3-A88B682D31B9}" type="datetimeFigureOut">
               <a:rPr lang="en-US" smtClean="0"/>
               <a:pPr/>
-              <a:t>1/8/14</a:t>
+              <a:t>1/3/2015</a:t>
             </a:fld>
             <a:endParaRPr lang="en-US"/>
           </a:p>
@@ -1652,7 +1673,7 @@
             <a:fld id="{E729771A-EB65-4961-8DE3-A88B682D31B9}" type="datetimeFigureOut">
               <a:rPr lang="en-US" smtClean="0"/>
               <a:pPr/>
-              <a:t>1/8/14</a:t>
+              <a:t>1/3/2015</a:t>
             </a:fld>
             <a:endParaRPr lang="en-US"/>
           </a:p>
@@ -1900,7 +1921,7 @@
             <a:fld id="{E729771A-EB65-4961-8DE3-A88B682D31B9}" type="datetimeFigureOut">
               <a:rPr lang="en-US" smtClean="0"/>
               <a:pPr/>
-              <a:t>1/8/14</a:t>
+              <a:t>1/3/2015</a:t>
             </a:fld>
             <a:endParaRPr lang="en-US"/>
           </a:p>
@@ -2190,7 +2211,7 @@
             <a:fld id="{E729771A-EB65-4961-8DE3-A88B682D31B9}" type="datetimeFigureOut">
               <a:rPr lang="en-US" smtClean="0"/>
               <a:pPr/>
-              <a:t>1/8/14</a:t>
+              <a:t>1/3/2015</a:t>
             </a:fld>
             <a:endParaRPr lang="en-US"/>
           </a:p>
@@ -2614,7 +2635,7 @@
             <a:fld id="{E729771A-EB65-4961-8DE3-A88B682D31B9}" type="datetimeFigureOut">
               <a:rPr lang="en-US" smtClean="0"/>
               <a:pPr/>
-              <a:t>1/8/14</a:t>
+              <a:t>1/3/2015</a:t>
             </a:fld>
             <a:endParaRPr lang="en-US"/>
           </a:p>
@@ -2734,7 +2755,7 @@
             <a:fld id="{E729771A-EB65-4961-8DE3-A88B682D31B9}" type="datetimeFigureOut">
               <a:rPr lang="en-US" smtClean="0"/>
               <a:pPr/>
-              <a:t>1/8/14</a:t>
+              <a:t>1/3/2015</a:t>
             </a:fld>
             <a:endParaRPr lang="en-US"/>
           </a:p>
@@ -2831,7 +2852,7 @@
             <a:fld id="{E729771A-EB65-4961-8DE3-A88B682D31B9}" type="datetimeFigureOut">
               <a:rPr lang="en-US" smtClean="0"/>
               <a:pPr/>
-              <a:t>1/8/14</a:t>
+              <a:t>1/3/2015</a:t>
             </a:fld>
             <a:endParaRPr lang="en-US"/>
           </a:p>
@@ -3110,7 +3131,7 @@
             <a:fld id="{E729771A-EB65-4961-8DE3-A88B682D31B9}" type="datetimeFigureOut">
               <a:rPr lang="en-US" smtClean="0"/>
               <a:pPr/>
-              <a:t>1/8/14</a:t>
+              <a:t>1/3/2015</a:t>
             </a:fld>
             <a:endParaRPr lang="en-US"/>
           </a:p>
@@ -3365,7 +3386,7 @@
             <a:fld id="{E729771A-EB65-4961-8DE3-A88B682D31B9}" type="datetimeFigureOut">
               <a:rPr lang="en-US" smtClean="0"/>
               <a:pPr/>
-              <a:t>1/8/14</a:t>
+              <a:t>1/3/2015</a:t>
             </a:fld>
             <a:endParaRPr lang="en-US"/>
           </a:p>
@@ -3580,7 +3601,7 @@
             <a:fld id="{E729771A-EB65-4961-8DE3-A88B682D31B9}" type="datetimeFigureOut">
               <a:rPr lang="en-US" smtClean="0"/>
               <a:pPr/>
-              <a:t>1/8/14</a:t>
+              <a:t>1/3/2015</a:t>
             </a:fld>
             <a:endParaRPr lang="en-US"/>
           </a:p>
@@ -3667,7 +3688,7 @@
       </p:sp>
       <p:pic>
         <p:nvPicPr>
-          <p:cNvPr id="7" name="Picture 6" descr="logo-codemash.png"/>
+          <p:cNvPr id="7" name="Picture 6"/>
           <p:cNvPicPr>
             <a:picLocks noChangeAspect="1"/>
           </p:cNvPicPr>
@@ -3687,8 +3708,8 @@
         </p:blipFill>
         <p:spPr>
           <a:xfrm>
-            <a:off x="0" y="0"/>
-            <a:ext cx="914400" cy="699725"/>
+            <a:off x="111498" y="119425"/>
+            <a:ext cx="574302" cy="699725"/>
           </a:xfrm>
           <a:prstGeom prst="rect">
             <a:avLst/>
@@ -4030,7 +4051,7 @@
         </p:spPr>
         <p:txBody>
           <a:bodyPr vert="horz" lIns="91440" tIns="45720" rIns="91440" bIns="45720" rtlCol="0">
-            <a:normAutofit fontScale="85000" lnSpcReduction="10000"/>
+            <a:normAutofit fontScale="92500" lnSpcReduction="20000"/>
           </a:bodyPr>
           <a:lstStyle/>
           <a:p>
@@ -4064,8 +4085,39 @@
                 <a:ea typeface="+mn-ea"/>
                 <a:cs typeface="Arial" pitchFamily="34" charset="0"/>
               </a:rPr>
-              <a:t>Steve Smith</a:t>
-            </a:r>
+              <a:t>Jeff </a:t>
+            </a:r>
+            <a:r>
+              <a:rPr kumimoji="0" lang="en-US" sz="3200" b="0" i="0" u="none" strike="noStrike" kern="1200" cap="none" spc="0" normalizeH="0" baseline="0" noProof="0" dirty="0" err="1" smtClean="0">
+                <a:ln>
+                  <a:noFill/>
+                </a:ln>
+                <a:solidFill>
+                  <a:schemeClr val="tx1"/>
+                </a:solidFill>
+                <a:effectLst/>
+                <a:uLnTx/>
+                <a:uFillTx/>
+                <a:latin typeface="+mj-lt"/>
+                <a:ea typeface="+mn-ea"/>
+                <a:cs typeface="Arial" pitchFamily="34" charset="0"/>
+              </a:rPr>
+              <a:t>Valore</a:t>
+            </a:r>
+            <a:endParaRPr kumimoji="0" lang="en-US" sz="3200" b="0" i="0" u="none" strike="noStrike" kern="1200" cap="none" spc="0" normalizeH="0" baseline="0" noProof="0" dirty="0" smtClean="0">
+              <a:ln>
+                <a:noFill/>
+              </a:ln>
+              <a:solidFill>
+                <a:schemeClr val="tx1"/>
+              </a:solidFill>
+              <a:effectLst/>
+              <a:uLnTx/>
+              <a:uFillTx/>
+              <a:latin typeface="+mj-lt"/>
+              <a:ea typeface="+mn-ea"/>
+              <a:cs typeface="Arial" pitchFamily="34" charset="0"/>
+            </a:endParaRPr>
           </a:p>
           <a:p>
             <a:pPr marL="342900" marR="0" lvl="0" indent="-342900" algn="l" defTabSz="914400" rtl="0" eaLnBrk="1" fontAlgn="auto" latinLnBrk="0" hangingPunct="1">
@@ -4083,23 +4135,20 @@
               <a:tabLst/>
               <a:defRPr/>
             </a:pPr>
-            <a:r>
-              <a:rPr kumimoji="0" lang="en-US" sz="3200" b="0" i="0" u="none" strike="noStrike" kern="1200" cap="none" spc="0" normalizeH="0" baseline="0" noProof="0" dirty="0" smtClean="0">
-                <a:ln>
-                  <a:noFill/>
-                </a:ln>
-                <a:solidFill>
-                  <a:schemeClr val="tx1"/>
-                </a:solidFill>
-                <a:effectLst/>
-                <a:uLnTx/>
-                <a:uFillTx/>
-                <a:latin typeface="+mj-lt"/>
-                <a:ea typeface="+mn-ea"/>
-                <a:cs typeface="Arial" pitchFamily="34" charset="0"/>
-              </a:rPr>
-              <a:t>Ardalis.com</a:t>
-            </a:r>
+            <a:endParaRPr kumimoji="0" lang="en-US" sz="3200" b="0" i="0" u="none" strike="noStrike" kern="1200" cap="none" spc="0" normalizeH="0" baseline="0" noProof="0" dirty="0" smtClean="0">
+              <a:ln>
+                <a:noFill/>
+              </a:ln>
+              <a:solidFill>
+                <a:schemeClr val="tx1"/>
+              </a:solidFill>
+              <a:effectLst/>
+              <a:uLnTx/>
+              <a:uFillTx/>
+              <a:latin typeface="+mj-lt"/>
+              <a:ea typeface="+mn-ea"/>
+              <a:cs typeface="Arial" pitchFamily="34" charset="0"/>
+            </a:endParaRPr>
           </a:p>
           <a:p>
             <a:pPr marL="342900" marR="0" lvl="0" indent="-342900" algn="l" defTabSz="914400" rtl="0" eaLnBrk="1" fontAlgn="auto" latinLnBrk="0" hangingPunct="1">
@@ -4137,28 +4186,11 @@
               <a:t>@</a:t>
             </a:r>
             <a:r>
-              <a:rPr lang="en-US" sz="3200" dirty="0" err="1">
+              <a:rPr lang="en-US" sz="3200" dirty="0" err="1" smtClean="0">
                 <a:latin typeface="+mj-lt"/>
                 <a:cs typeface="Arial" pitchFamily="34" charset="0"/>
               </a:rPr>
-              <a:t>a</a:t>
-            </a:r>
-            <a:r>
-              <a:rPr kumimoji="0" lang="en-US" sz="3200" b="0" i="0" u="none" strike="noStrike" kern="1200" cap="none" spc="0" normalizeH="0" baseline="0" noProof="0" dirty="0" err="1" smtClean="0">
-                <a:ln>
-                  <a:noFill/>
-                </a:ln>
-                <a:solidFill>
-                  <a:schemeClr val="tx1"/>
-                </a:solidFill>
-                <a:effectLst/>
-                <a:uLnTx/>
-                <a:uFillTx/>
-                <a:latin typeface="+mj-lt"/>
-                <a:ea typeface="+mn-ea"/>
-                <a:cs typeface="Arial" pitchFamily="34" charset="0"/>
-              </a:rPr>
-              <a:t>rdalis</a:t>
+              <a:t>CodingWithSpike</a:t>
             </a:r>
             <a:endParaRPr kumimoji="0" lang="en-US" sz="3200" b="0" i="0" u="none" strike="noStrike" kern="1200" cap="none" spc="0" normalizeH="0" baseline="0" noProof="0" dirty="0" smtClean="0">
               <a:ln>
@@ -4326,7 +4358,7 @@
   <p:timing>
     <p:tnLst>
       <p:par>
-        <p:cTn xmlns:p14="http://schemas.microsoft.com/office/powerpoint/2010/main" id="1" dur="indefinite" restart="never" nodeType="tmRoot"/>
+        <p:cTn id="1" dur="indefinite" restart="never" nodeType="tmRoot"/>
       </p:par>
     </p:tnLst>
   </p:timing>
@@ -4806,7 +4838,7 @@
   <p:timing>
     <p:tnLst>
       <p:par>
-        <p:cTn xmlns:p14="http://schemas.microsoft.com/office/powerpoint/2010/main" id="1" dur="indefinite" restart="never" nodeType="tmRoot"/>
+        <p:cTn id="1" dur="indefinite" restart="never" nodeType="tmRoot"/>
       </p:par>
     </p:tnLst>
   </p:timing>
@@ -4852,7 +4884,7 @@
   <p:timing>
     <p:tnLst>
       <p:par>
-        <p:cTn xmlns:p14="http://schemas.microsoft.com/office/powerpoint/2010/main" id="1" dur="indefinite" restart="never" nodeType="tmRoot"/>
+        <p:cTn id="1" dur="indefinite" restart="never" nodeType="tmRoot"/>
       </p:par>
     </p:tnLst>
   </p:timing>
@@ -4937,7 +4969,7 @@
   <p:timing>
     <p:tnLst>
       <p:par>
-        <p:cTn xmlns:p14="http://schemas.microsoft.com/office/powerpoint/2010/main" id="1" dur="indefinite" restart="never" nodeType="tmRoot"/>
+        <p:cTn id="1" dur="indefinite" restart="never" nodeType="tmRoot"/>
       </p:par>
     </p:tnLst>
   </p:timing>
@@ -5028,7 +5060,7 @@
   <p:timing>
     <p:tnLst>
       <p:par>
-        <p:cTn xmlns:p14="http://schemas.microsoft.com/office/powerpoint/2010/main" id="1" dur="indefinite" restart="never" nodeType="tmRoot"/>
+        <p:cTn id="1" dur="indefinite" restart="never" nodeType="tmRoot"/>
       </p:par>
     </p:tnLst>
   </p:timing>
@@ -5117,7 +5149,7 @@
   <p:timing>
     <p:tnLst>
       <p:par>
-        <p:cTn xmlns:p14="http://schemas.microsoft.com/office/powerpoint/2010/main" id="1" dur="indefinite" restart="never" nodeType="tmRoot"/>
+        <p:cTn id="1" dur="indefinite" restart="never" nodeType="tmRoot"/>
       </p:par>
     </p:tnLst>
   </p:timing>
@@ -5207,7 +5239,7 @@
   <p:timing>
     <p:tnLst>
       <p:par>
-        <p:cTn xmlns:p14="http://schemas.microsoft.com/office/powerpoint/2010/main" id="1" dur="indefinite" restart="never" nodeType="tmRoot"/>
+        <p:cTn id="1" dur="indefinite" restart="never" nodeType="tmRoot"/>
       </p:par>
     </p:tnLst>
   </p:timing>
@@ -5289,7 +5321,7 @@
   <p:timing>
     <p:tnLst>
       <p:par>
-        <p:cTn xmlns:p14="http://schemas.microsoft.com/office/powerpoint/2010/main" id="1" dur="indefinite" restart="never" nodeType="tmRoot"/>
+        <p:cTn id="1" dur="indefinite" restart="never" nodeType="tmRoot"/>
       </p:par>
     </p:tnLst>
   </p:timing>
@@ -5499,7 +5531,7 @@
   <p:timing>
     <p:tnLst>
       <p:par>
-        <p:cTn xmlns:p14="http://schemas.microsoft.com/office/powerpoint/2010/main" id="1" dur="indefinite" restart="never" nodeType="tmRoot"/>
+        <p:cTn id="1" dur="indefinite" restart="never" nodeType="tmRoot"/>
       </p:par>
     </p:tnLst>
   </p:timing>

</xml_diff>

<commit_message>
Updating Intro Title Slide to match others
</commit_message>
<xml_diff>
--- a/00-Software Craftsmanship.pptx
+++ b/00-Software Craftsmanship.pptx
@@ -8,7 +8,7 @@
     <p:notesMasterId r:id="rId16"/>
   </p:notesMasterIdLst>
   <p:sldIdLst>
-    <p:sldId id="256" r:id="rId2"/>
+    <p:sldId id="284" r:id="rId2"/>
     <p:sldId id="264" r:id="rId3"/>
     <p:sldId id="282" r:id="rId4"/>
     <p:sldId id="283" r:id="rId5"/>
@@ -227,7 +227,7 @@
             <a:fld id="{657F9423-C4A1-46DE-88F2-C85BC06777B4}" type="datetimeFigureOut">
               <a:rPr lang="en-US" smtClean="0"/>
               <a:pPr/>
-              <a:t>1/3/2015</a:t>
+              <a:t>1/5/2015</a:t>
             </a:fld>
             <a:endParaRPr lang="en-US"/>
           </a:p>
@@ -517,24 +517,42 @@
       </p:grpSpPr>
       <p:sp>
         <p:nvSpPr>
-          <p:cNvPr id="2" name="Slide Image Placeholder 1"/>
-          <p:cNvSpPr>
-            <a:spLocks noGrp="1" noRot="1" noChangeAspect="1"/>
+          <p:cNvPr id="72706" name="Slide Image Placeholder 1"/>
+          <p:cNvSpPr>
+            <a:spLocks noGrp="1" noRot="1" noChangeAspect="1" noTextEdit="1"/>
           </p:cNvSpPr>
           <p:nvPr>
             <p:ph type="sldImg"/>
           </p:nvPr>
         </p:nvSpPr>
-        <p:spPr>
+        <p:spPr bwMode="auto">
           <a:xfrm>
             <a:off x="381000" y="685800"/>
             <a:ext cx="6096000" cy="3429000"/>
           </a:xfrm>
+          <a:noFill/>
+          <a:ln>
+            <a:solidFill>
+              <a:srgbClr val="000000"/>
+            </a:solidFill>
+            <a:miter lim="800000"/>
+            <a:headEnd/>
+            <a:tailEnd/>
+          </a:ln>
+          <a:extLst>
+            <a:ext uri="{909E8E84-426E-40dd-AFC4-6F175D3DCCD1}">
+              <a14:hiddenFill xmlns="" xmlns:a14="http://schemas.microsoft.com/office/drawing/2010/main">
+                <a:solidFill>
+                  <a:srgbClr val="FFFFFF"/>
+                </a:solidFill>
+              </a14:hiddenFill>
+            </a:ext>
+          </a:extLst>
         </p:spPr>
       </p:sp>
       <p:sp>
         <p:nvSpPr>
-          <p:cNvPr id="3" name="Notes Placeholder 2"/>
+          <p:cNvPr id="72707" name="Notes Placeholder 2"/>
           <p:cNvSpPr>
             <a:spLocks noGrp="1"/>
           </p:cNvSpPr>
@@ -542,92 +560,200 @@
             <p:ph type="body" idx="1"/>
           </p:nvPr>
         </p:nvSpPr>
-        <p:spPr/>
-        <p:txBody>
-          <a:bodyPr/>
-          <a:lstStyle/>
-          <a:p>
-            <a:r>
-              <a:rPr lang="en-US" dirty="0" smtClean="0"/>
-              <a:t>Welcome everyone and good morning. Glad</a:t>
-            </a:r>
-            <a:r>
-              <a:rPr lang="en-US" baseline="0" dirty="0" smtClean="0"/>
-              <a:t> everyone fought through the hangovers to make it here bright and early in the morning. My name is Brendan Enrick and this is </a:t>
-            </a:r>
-            <a:r>
-              <a:rPr lang="en-US" baseline="0" dirty="0" smtClean="0"/>
-              <a:t>Jeff </a:t>
-            </a:r>
-            <a:r>
-              <a:rPr lang="en-US" baseline="0" dirty="0" err="1" smtClean="0"/>
-              <a:t>Valore</a:t>
-            </a:r>
-            <a:r>
-              <a:rPr lang="en-US" baseline="0" dirty="0" smtClean="0"/>
-              <a:t>, </a:t>
-            </a:r>
-            <a:r>
-              <a:rPr lang="en-US" baseline="0" dirty="0" smtClean="0"/>
-              <a:t>and today we’re going to be talking about software craftsmanship. </a:t>
-            </a:r>
-          </a:p>
-          <a:p>
-            <a:endParaRPr lang="en-US" baseline="0" dirty="0" smtClean="0"/>
-          </a:p>
-          <a:p>
-            <a:r>
-              <a:rPr lang="en-US" baseline="0" dirty="0" smtClean="0"/>
-              <a:t>I’d like to start out by finding out who here has at least heard about software craftsmanship before? OK awesome. Anyone here read the software craftsmanship manifesto?</a:t>
-            </a:r>
-          </a:p>
-          <a:p>
-            <a:endParaRPr lang="en-US" baseline="0" dirty="0" smtClean="0"/>
-          </a:p>
-          <a:p>
-            <a:r>
-              <a:rPr lang="en-US" baseline="0" dirty="0" smtClean="0"/>
-              <a:t>OK. Well this is a beginners course designed to introduce what </a:t>
-            </a:r>
-            <a:r>
-              <a:rPr lang="en-US" baseline="0" dirty="0" err="1" smtClean="0"/>
-              <a:t>softare</a:t>
-            </a:r>
-            <a:r>
-              <a:rPr lang="en-US" baseline="0" dirty="0" smtClean="0"/>
-              <a:t> craftsmanship is, why it’s important, and is heavily focused on the individual’s interest in software craftsmanship and less on the community. If you’d like to talk about that afterwards, I think either of us would be glad to discuss it with you after the session.</a:t>
-            </a:r>
-          </a:p>
-        </p:txBody>
-      </p:sp>
-      <p:sp>
-        <p:nvSpPr>
-          <p:cNvPr id="4" name="Slide Number Placeholder 3"/>
-          <p:cNvSpPr>
-            <a:spLocks noGrp="1"/>
-          </p:cNvSpPr>
-          <p:nvPr>
-            <p:ph type="sldNum" sz="quarter" idx="10"/>
-          </p:nvPr>
-        </p:nvSpPr>
-        <p:spPr/>
-        <p:txBody>
-          <a:bodyPr/>
-          <a:lstStyle/>
-          <a:p>
-            <a:fld id="{B58A8F46-A98F-42F5-B8A6-DC332A07CAEB}" type="slidenum">
-              <a:rPr lang="en-US" smtClean="0"/>
+        <p:spPr bwMode="auto">
+          <a:noFill/>
+          <a:extLst>
+            <a:ext uri="{909E8E84-426E-40dd-AFC4-6F175D3DCCD1}">
+              <a14:hiddenFill xmlns="" xmlns:a14="http://schemas.microsoft.com/office/drawing/2010/main">
+                <a:solidFill>
+                  <a:srgbClr val="FFFFFF"/>
+                </a:solidFill>
+              </a14:hiddenFill>
+            </a:ext>
+            <a:ext uri="{91240B29-F687-4f45-9708-019B960494DF}">
+              <a14:hiddenLine xmlns="" xmlns:a14="http://schemas.microsoft.com/office/drawing/2010/main" w="9525">
+                <a:solidFill>
+                  <a:srgbClr val="000000"/>
+                </a:solidFill>
+                <a:miter lim="800000"/>
+                <a:headEnd/>
+                <a:tailEnd/>
+              </a14:hiddenLine>
+            </a:ext>
+          </a:extLst>
+        </p:spPr>
+        <p:txBody>
+          <a:bodyPr wrap="square" numCol="1" anchor="t" anchorCtr="0" compatLnSpc="1">
+            <a:prstTxWarp prst="textNoShape">
+              <a:avLst/>
+            </a:prstTxWarp>
+          </a:bodyPr>
+          <a:lstStyle/>
+          <a:p>
+            <a:pPr eaLnBrk="1" hangingPunct="1"/>
+            <a:endParaRPr lang="en-US" smtClean="0"/>
+          </a:p>
+        </p:txBody>
+      </p:sp>
+      <p:sp>
+        <p:nvSpPr>
+          <p:cNvPr id="72708" name="Slide Number Placeholder 3"/>
+          <p:cNvSpPr>
+            <a:spLocks noGrp="1"/>
+          </p:cNvSpPr>
+          <p:nvPr>
+            <p:ph type="sldNum" sz="quarter" idx="5"/>
+          </p:nvPr>
+        </p:nvSpPr>
+        <p:spPr bwMode="auto">
+          <a:noFill/>
+          <a:extLst>
+            <a:ext uri="{909E8E84-426E-40dd-AFC4-6F175D3DCCD1}">
+              <a14:hiddenFill xmlns="" xmlns:a14="http://schemas.microsoft.com/office/drawing/2010/main">
+                <a:solidFill>
+                  <a:srgbClr val="FFFFFF"/>
+                </a:solidFill>
+              </a14:hiddenFill>
+            </a:ext>
+            <a:ext uri="{91240B29-F687-4f45-9708-019B960494DF}">
+              <a14:hiddenLine xmlns="" xmlns:a14="http://schemas.microsoft.com/office/drawing/2010/main" w="9525">
+                <a:solidFill>
+                  <a:srgbClr val="000000"/>
+                </a:solidFill>
+                <a:miter lim="800000"/>
+                <a:headEnd/>
+                <a:tailEnd/>
+              </a14:hiddenLine>
+            </a:ext>
+          </a:extLst>
+        </p:spPr>
+        <p:txBody>
+          <a:bodyPr/>
+          <a:lstStyle>
+            <a:lvl1pPr>
+              <a:defRPr>
+                <a:solidFill>
+                  <a:schemeClr val="tx1"/>
+                </a:solidFill>
+                <a:latin typeface="News Gothic MT" charset="0"/>
+                <a:ea typeface="MS PGothic" panose="020B0600070205080204" pitchFamily="34" charset="-128"/>
+              </a:defRPr>
+            </a:lvl1pPr>
+            <a:lvl2pPr marL="742950" indent="-285750">
+              <a:defRPr>
+                <a:solidFill>
+                  <a:schemeClr val="tx1"/>
+                </a:solidFill>
+                <a:latin typeface="News Gothic MT" charset="0"/>
+                <a:ea typeface="MS PGothic" panose="020B0600070205080204" pitchFamily="34" charset="-128"/>
+              </a:defRPr>
+            </a:lvl2pPr>
+            <a:lvl3pPr marL="1143000" indent="-228600">
+              <a:defRPr>
+                <a:solidFill>
+                  <a:schemeClr val="tx1"/>
+                </a:solidFill>
+                <a:latin typeface="News Gothic MT" charset="0"/>
+                <a:ea typeface="MS PGothic" panose="020B0600070205080204" pitchFamily="34" charset="-128"/>
+              </a:defRPr>
+            </a:lvl3pPr>
+            <a:lvl4pPr marL="1600200" indent="-228600">
+              <a:defRPr>
+                <a:solidFill>
+                  <a:schemeClr val="tx1"/>
+                </a:solidFill>
+                <a:latin typeface="News Gothic MT" charset="0"/>
+                <a:ea typeface="MS PGothic" panose="020B0600070205080204" pitchFamily="34" charset="-128"/>
+              </a:defRPr>
+            </a:lvl4pPr>
+            <a:lvl5pPr marL="2057400" indent="-228600">
+              <a:defRPr>
+                <a:solidFill>
+                  <a:schemeClr val="tx1"/>
+                </a:solidFill>
+                <a:latin typeface="News Gothic MT" charset="0"/>
+                <a:ea typeface="MS PGothic" panose="020B0600070205080204" pitchFamily="34" charset="-128"/>
+              </a:defRPr>
+            </a:lvl5pPr>
+            <a:lvl6pPr marL="2514600" indent="-228600" defTabSz="457200" eaLnBrk="0" fontAlgn="base" hangingPunct="0">
+              <a:spcBef>
+                <a:spcPct val="0"/>
+              </a:spcBef>
+              <a:spcAft>
+                <a:spcPct val="0"/>
+              </a:spcAft>
+              <a:defRPr>
+                <a:solidFill>
+                  <a:schemeClr val="tx1"/>
+                </a:solidFill>
+                <a:latin typeface="News Gothic MT" charset="0"/>
+                <a:ea typeface="MS PGothic" panose="020B0600070205080204" pitchFamily="34" charset="-128"/>
+              </a:defRPr>
+            </a:lvl6pPr>
+            <a:lvl7pPr marL="2971800" indent="-228600" defTabSz="457200" eaLnBrk="0" fontAlgn="base" hangingPunct="0">
+              <a:spcBef>
+                <a:spcPct val="0"/>
+              </a:spcBef>
+              <a:spcAft>
+                <a:spcPct val="0"/>
+              </a:spcAft>
+              <a:defRPr>
+                <a:solidFill>
+                  <a:schemeClr val="tx1"/>
+                </a:solidFill>
+                <a:latin typeface="News Gothic MT" charset="0"/>
+                <a:ea typeface="MS PGothic" panose="020B0600070205080204" pitchFamily="34" charset="-128"/>
+              </a:defRPr>
+            </a:lvl7pPr>
+            <a:lvl8pPr marL="3429000" indent="-228600" defTabSz="457200" eaLnBrk="0" fontAlgn="base" hangingPunct="0">
+              <a:spcBef>
+                <a:spcPct val="0"/>
+              </a:spcBef>
+              <a:spcAft>
+                <a:spcPct val="0"/>
+              </a:spcAft>
+              <a:defRPr>
+                <a:solidFill>
+                  <a:schemeClr val="tx1"/>
+                </a:solidFill>
+                <a:latin typeface="News Gothic MT" charset="0"/>
+                <a:ea typeface="MS PGothic" panose="020B0600070205080204" pitchFamily="34" charset="-128"/>
+              </a:defRPr>
+            </a:lvl8pPr>
+            <a:lvl9pPr marL="3886200" indent="-228600" defTabSz="457200" eaLnBrk="0" fontAlgn="base" hangingPunct="0">
+              <a:spcBef>
+                <a:spcPct val="0"/>
+              </a:spcBef>
+              <a:spcAft>
+                <a:spcPct val="0"/>
+              </a:spcAft>
+              <a:defRPr>
+                <a:solidFill>
+                  <a:schemeClr val="tx1"/>
+                </a:solidFill>
+                <a:latin typeface="News Gothic MT" charset="0"/>
+                <a:ea typeface="MS PGothic" panose="020B0600070205080204" pitchFamily="34" charset="-128"/>
+              </a:defRPr>
+            </a:lvl9pPr>
+          </a:lstStyle>
+          <a:p>
+            <a:fld id="{66079989-EE66-4210-81F4-CE2C8AF8EFCB}" type="slidenum">
+              <a:rPr lang="en-US" smtClean="0">
+                <a:latin typeface="Calibri" panose="020F0502020204030204" pitchFamily="34" charset="0"/>
+              </a:rPr>
               <a:pPr/>
               <a:t>1</a:t>
             </a:fld>
-            <a:endParaRPr lang="en-US"/>
+            <a:endParaRPr lang="en-US" smtClean="0">
+              <a:latin typeface="Calibri" panose="020F0502020204030204" pitchFamily="34" charset="0"/>
+            </a:endParaRPr>
           </a:p>
         </p:txBody>
       </p:sp>
     </p:spTree>
     <p:extLst>
       <p:ext uri="{BB962C8B-B14F-4D97-AF65-F5344CB8AC3E}">
-        <p14:creationId xmlns:p14="http://schemas.microsoft.com/office/powerpoint/2010/main" val="1332637937"/>
+        <p14:creationId xmlns:p14="http://schemas.microsoft.com/office/powerpoint/2010/main" val="1346900034"/>
       </p:ext>
     </p:extLst>
   </p:cSld>
@@ -1147,7 +1273,7 @@
             <a:fld id="{E729771A-EB65-4961-8DE3-A88B682D31B9}" type="datetimeFigureOut">
               <a:rPr lang="en-US" smtClean="0"/>
               <a:pPr/>
-              <a:t>1/3/2015</a:t>
+              <a:t>1/5/2015</a:t>
             </a:fld>
             <a:endParaRPr lang="en-US"/>
           </a:p>
@@ -1319,7 +1445,7 @@
             <a:fld id="{E729771A-EB65-4961-8DE3-A88B682D31B9}" type="datetimeFigureOut">
               <a:rPr lang="en-US" smtClean="0"/>
               <a:pPr/>
-              <a:t>1/3/2015</a:t>
+              <a:t>1/5/2015</a:t>
             </a:fld>
             <a:endParaRPr lang="en-US"/>
           </a:p>
@@ -1501,7 +1627,7 @@
             <a:fld id="{E729771A-EB65-4961-8DE3-A88B682D31B9}" type="datetimeFigureOut">
               <a:rPr lang="en-US" smtClean="0"/>
               <a:pPr/>
-              <a:t>1/3/2015</a:t>
+              <a:t>1/5/2015</a:t>
             </a:fld>
             <a:endParaRPr lang="en-US"/>
           </a:p>
@@ -1673,7 +1799,7 @@
             <a:fld id="{E729771A-EB65-4961-8DE3-A88B682D31B9}" type="datetimeFigureOut">
               <a:rPr lang="en-US" smtClean="0"/>
               <a:pPr/>
-              <a:t>1/3/2015</a:t>
+              <a:t>1/5/2015</a:t>
             </a:fld>
             <a:endParaRPr lang="en-US"/>
           </a:p>
@@ -1921,7 +2047,7 @@
             <a:fld id="{E729771A-EB65-4961-8DE3-A88B682D31B9}" type="datetimeFigureOut">
               <a:rPr lang="en-US" smtClean="0"/>
               <a:pPr/>
-              <a:t>1/3/2015</a:t>
+              <a:t>1/5/2015</a:t>
             </a:fld>
             <a:endParaRPr lang="en-US"/>
           </a:p>
@@ -2211,7 +2337,7 @@
             <a:fld id="{E729771A-EB65-4961-8DE3-A88B682D31B9}" type="datetimeFigureOut">
               <a:rPr lang="en-US" smtClean="0"/>
               <a:pPr/>
-              <a:t>1/3/2015</a:t>
+              <a:t>1/5/2015</a:t>
             </a:fld>
             <a:endParaRPr lang="en-US"/>
           </a:p>
@@ -2635,7 +2761,7 @@
             <a:fld id="{E729771A-EB65-4961-8DE3-A88B682D31B9}" type="datetimeFigureOut">
               <a:rPr lang="en-US" smtClean="0"/>
               <a:pPr/>
-              <a:t>1/3/2015</a:t>
+              <a:t>1/5/2015</a:t>
             </a:fld>
             <a:endParaRPr lang="en-US"/>
           </a:p>
@@ -2755,7 +2881,7 @@
             <a:fld id="{E729771A-EB65-4961-8DE3-A88B682D31B9}" type="datetimeFigureOut">
               <a:rPr lang="en-US" smtClean="0"/>
               <a:pPr/>
-              <a:t>1/3/2015</a:t>
+              <a:t>1/5/2015</a:t>
             </a:fld>
             <a:endParaRPr lang="en-US"/>
           </a:p>
@@ -2852,7 +2978,7 @@
             <a:fld id="{E729771A-EB65-4961-8DE3-A88B682D31B9}" type="datetimeFigureOut">
               <a:rPr lang="en-US" smtClean="0"/>
               <a:pPr/>
-              <a:t>1/3/2015</a:t>
+              <a:t>1/5/2015</a:t>
             </a:fld>
             <a:endParaRPr lang="en-US"/>
           </a:p>
@@ -3131,7 +3257,7 @@
             <a:fld id="{E729771A-EB65-4961-8DE3-A88B682D31B9}" type="datetimeFigureOut">
               <a:rPr lang="en-US" smtClean="0"/>
               <a:pPr/>
-              <a:t>1/3/2015</a:t>
+              <a:t>1/5/2015</a:t>
             </a:fld>
             <a:endParaRPr lang="en-US"/>
           </a:p>
@@ -3386,7 +3512,7 @@
             <a:fld id="{E729771A-EB65-4961-8DE3-A88B682D31B9}" type="datetimeFigureOut">
               <a:rPr lang="en-US" smtClean="0"/>
               <a:pPr/>
-              <a:t>1/3/2015</a:t>
+              <a:t>1/5/2015</a:t>
             </a:fld>
             <a:endParaRPr lang="en-US"/>
           </a:p>
@@ -3601,7 +3727,7 @@
             <a:fld id="{E729771A-EB65-4961-8DE3-A88B682D31B9}" type="datetimeFigureOut">
               <a:rPr lang="en-US" smtClean="0"/>
               <a:pPr/>
-              <a:t>1/3/2015</a:t>
+              <a:t>1/5/2015</a:t>
             </a:fld>
             <a:endParaRPr lang="en-US"/>
           </a:p>
@@ -4009,7 +4135,7 @@
       </p:grpSpPr>
       <p:sp>
         <p:nvSpPr>
-          <p:cNvPr id="2" name="Title 1"/>
+          <p:cNvPr id="71682" name="Title 1"/>
           <p:cNvSpPr>
             <a:spLocks noGrp="1"/>
           </p:cNvSpPr>
@@ -4017,24 +4143,75 @@
             <p:ph type="ctrTitle"/>
           </p:nvPr>
         </p:nvSpPr>
-        <p:spPr/>
+        <p:spPr>
+          <a:xfrm>
+            <a:off x="971550" y="2227660"/>
+            <a:ext cx="7259638" cy="1235869"/>
+          </a:xfrm>
+        </p:spPr>
         <p:txBody>
           <a:bodyPr>
             <a:normAutofit fontScale="90000"/>
           </a:bodyPr>
           <a:lstStyle/>
           <a:p>
-            <a:r>
-              <a:rPr lang="en-US" dirty="0" smtClean="0"/>
+            <a:pPr eaLnBrk="1" hangingPunct="1"/>
+            <a:r>
+              <a:rPr lang="en-US" dirty="0" smtClean="0">
+                <a:latin typeface="News Gothic Com Thin" panose="020B0204030503020204" pitchFamily="34" charset="0"/>
+                <a:cs typeface="News Gothic Com Thin" panose="020B0204030503020204" pitchFamily="34" charset="0"/>
+              </a:rPr>
               <a:t>Beginning Software Craftsmanship</a:t>
             </a:r>
-            <a:endParaRPr lang="en-US" dirty="0"/>
-          </a:p>
-        </p:txBody>
-      </p:sp>
-      <p:sp>
-        <p:nvSpPr>
-          <p:cNvPr id="5" name="Content Placeholder 4"/>
+          </a:p>
+        </p:txBody>
+      </p:sp>
+      <p:sp>
+        <p:nvSpPr>
+          <p:cNvPr id="4098" name="Subtitle 2"/>
+          <p:cNvSpPr>
+            <a:spLocks noGrp="1"/>
+          </p:cNvSpPr>
+          <p:nvPr>
+            <p:ph type="subTitle" idx="1"/>
+          </p:nvPr>
+        </p:nvSpPr>
+        <p:spPr>
+          <a:xfrm>
+            <a:off x="1371600" y="3563541"/>
+            <a:ext cx="6859588" cy="339328"/>
+          </a:xfrm>
+        </p:spPr>
+        <p:txBody>
+          <a:bodyPr>
+            <a:normAutofit fontScale="62500" lnSpcReduction="20000"/>
+          </a:bodyPr>
+          <a:lstStyle/>
+          <a:p>
+            <a:pPr eaLnBrk="1" hangingPunct="1">
+              <a:defRPr/>
+            </a:pPr>
+            <a:r>
+              <a:rPr lang="en-US" dirty="0" smtClean="0">
+                <a:latin typeface="News Gothic Com Thin" charset="0"/>
+              </a:rPr>
+              <a:t>Brendan Enrick | @</a:t>
+            </a:r>
+            <a:r>
+              <a:rPr lang="en-US" dirty="0" err="1" smtClean="0">
+                <a:latin typeface="News Gothic Com Thin" charset="0"/>
+              </a:rPr>
+              <a:t>Brendoneus</a:t>
+            </a:r>
+            <a:endParaRPr lang="en-US" dirty="0">
+              <a:latin typeface="News Gothic Com Thin" charset="0"/>
+            </a:endParaRPr>
+          </a:p>
+        </p:txBody>
+      </p:sp>
+      <p:sp>
+        <p:nvSpPr>
+          <p:cNvPr id="4" name="Subtitle 2"/>
           <p:cNvSpPr txBox="1">
             <a:spLocks/>
           </p:cNvSpPr>
@@ -4042,8 +4219,8 @@
         </p:nvSpPr>
         <p:spPr>
           <a:xfrm>
-            <a:off x="4495800" y="2800350"/>
-            <a:ext cx="3962400" cy="1371600"/>
+            <a:off x="1373332" y="3871557"/>
+            <a:ext cx="6859588" cy="339328"/>
           </a:xfrm>
           <a:prstGeom prst="rect">
             <a:avLst/>
@@ -4051,310 +4228,210 @@
         </p:spPr>
         <p:txBody>
           <a:bodyPr vert="horz" lIns="91440" tIns="45720" rIns="91440" bIns="45720" rtlCol="0">
-            <a:normAutofit fontScale="92500" lnSpcReduction="20000"/>
+            <a:normAutofit fontScale="62500" lnSpcReduction="20000"/>
           </a:bodyPr>
-          <a:lstStyle/>
-          <a:p>
-            <a:pPr marL="342900" marR="0" lvl="0" indent="-342900" algn="l" defTabSz="914400" rtl="0" eaLnBrk="1" fontAlgn="auto" latinLnBrk="0" hangingPunct="1">
-              <a:lnSpc>
-                <a:spcPct val="100000"/>
-              </a:lnSpc>
+          <a:lstStyle>
+            <a:lvl1pPr marL="0" indent="0" algn="ctr" defTabSz="457200" rtl="0" eaLnBrk="1" latinLnBrk="0" hangingPunct="1">
               <a:spcBef>
                 <a:spcPct val="20000"/>
               </a:spcBef>
-              <a:spcAft>
-                <a:spcPts val="0"/>
-              </a:spcAft>
-              <a:buClrTx/>
-              <a:buSzTx/>
-              <a:tabLst/>
-              <a:defRPr/>
-            </a:pPr>
-            <a:r>
-              <a:rPr kumimoji="0" lang="en-US" sz="3200" b="0" i="0" u="none" strike="noStrike" kern="1200" cap="none" spc="0" normalizeH="0" baseline="0" noProof="0" dirty="0" smtClean="0">
-                <a:ln>
-                  <a:noFill/>
-                </a:ln>
+              <a:buFont typeface="Arial"/>
+              <a:buNone/>
+              <a:defRPr sz="3200" kern="1200">
                 <a:solidFill>
-                  <a:schemeClr val="tx1"/>
+                  <a:schemeClr val="tx1">
+                    <a:tint val="75000"/>
+                  </a:schemeClr>
                 </a:solidFill>
-                <a:effectLst/>
-                <a:uLnTx/>
-                <a:uFillTx/>
-                <a:latin typeface="+mj-lt"/>
+                <a:latin typeface="+mn-lt"/>
                 <a:ea typeface="+mn-ea"/>
-                <a:cs typeface="Arial" pitchFamily="34" charset="0"/>
-              </a:rPr>
-              <a:t>Jeff </a:t>
-            </a:r>
-            <a:r>
-              <a:rPr kumimoji="0" lang="en-US" sz="3200" b="0" i="0" u="none" strike="noStrike" kern="1200" cap="none" spc="0" normalizeH="0" baseline="0" noProof="0" dirty="0" err="1" smtClean="0">
-                <a:ln>
-                  <a:noFill/>
-                </a:ln>
-                <a:solidFill>
-                  <a:schemeClr val="tx1"/>
-                </a:solidFill>
-                <a:effectLst/>
-                <a:uLnTx/>
-                <a:uFillTx/>
-                <a:latin typeface="+mj-lt"/>
-                <a:ea typeface="+mn-ea"/>
-                <a:cs typeface="Arial" pitchFamily="34" charset="0"/>
-              </a:rPr>
-              <a:t>Valore</a:t>
-            </a:r>
-            <a:endParaRPr kumimoji="0" lang="en-US" sz="3200" b="0" i="0" u="none" strike="noStrike" kern="1200" cap="none" spc="0" normalizeH="0" baseline="0" noProof="0" dirty="0" smtClean="0">
-              <a:ln>
-                <a:noFill/>
-              </a:ln>
-              <a:solidFill>
-                <a:schemeClr val="tx1"/>
-              </a:solidFill>
-              <a:effectLst/>
-              <a:uLnTx/>
-              <a:uFillTx/>
-              <a:latin typeface="+mj-lt"/>
-              <a:ea typeface="+mn-ea"/>
-              <a:cs typeface="Arial" pitchFamily="34" charset="0"/>
-            </a:endParaRPr>
-          </a:p>
-          <a:p>
-            <a:pPr marL="342900" marR="0" lvl="0" indent="-342900" algn="l" defTabSz="914400" rtl="0" eaLnBrk="1" fontAlgn="auto" latinLnBrk="0" hangingPunct="1">
-              <a:lnSpc>
-                <a:spcPct val="100000"/>
-              </a:lnSpc>
+                <a:cs typeface="+mn-cs"/>
+              </a:defRPr>
+            </a:lvl1pPr>
+            <a:lvl2pPr marL="457200" indent="0" algn="ctr" defTabSz="457200" rtl="0" eaLnBrk="1" latinLnBrk="0" hangingPunct="1">
               <a:spcBef>
                 <a:spcPct val="20000"/>
               </a:spcBef>
-              <a:spcAft>
-                <a:spcPts val="0"/>
-              </a:spcAft>
-              <a:buClrTx/>
-              <a:buSzTx/>
-              <a:tabLst/>
-              <a:defRPr/>
-            </a:pPr>
-            <a:endParaRPr kumimoji="0" lang="en-US" sz="3200" b="0" i="0" u="none" strike="noStrike" kern="1200" cap="none" spc="0" normalizeH="0" baseline="0" noProof="0" dirty="0" smtClean="0">
-              <a:ln>
-                <a:noFill/>
-              </a:ln>
-              <a:solidFill>
-                <a:schemeClr val="tx1"/>
-              </a:solidFill>
-              <a:effectLst/>
-              <a:uLnTx/>
-              <a:uFillTx/>
-              <a:latin typeface="+mj-lt"/>
-              <a:ea typeface="+mn-ea"/>
-              <a:cs typeface="Arial" pitchFamily="34" charset="0"/>
-            </a:endParaRPr>
-          </a:p>
-          <a:p>
-            <a:pPr marL="342900" marR="0" lvl="0" indent="-342900" algn="l" defTabSz="914400" rtl="0" eaLnBrk="1" fontAlgn="auto" latinLnBrk="0" hangingPunct="1">
-              <a:lnSpc>
-                <a:spcPct val="100000"/>
-              </a:lnSpc>
+              <a:buFont typeface="Arial"/>
+              <a:buNone/>
+              <a:defRPr sz="2800" kern="1200">
+                <a:solidFill>
+                  <a:schemeClr val="tx1">
+                    <a:tint val="75000"/>
+                  </a:schemeClr>
+                </a:solidFill>
+                <a:latin typeface="+mn-lt"/>
+                <a:ea typeface="+mn-ea"/>
+                <a:cs typeface="+mn-cs"/>
+              </a:defRPr>
+            </a:lvl2pPr>
+            <a:lvl3pPr marL="914400" indent="0" algn="ctr" defTabSz="457200" rtl="0" eaLnBrk="1" latinLnBrk="0" hangingPunct="1">
               <a:spcBef>
                 <a:spcPct val="20000"/>
               </a:spcBef>
-              <a:spcAft>
-                <a:spcPts val="0"/>
-              </a:spcAft>
-              <a:buClrTx/>
-              <a:buSzTx/>
-              <a:buFont typeface="Arial" pitchFamily="34" charset="0"/>
-              <a:buNone/>
-              <a:tabLst/>
-              <a:defRPr/>
-            </a:pPr>
-            <a:r>
-              <a:rPr kumimoji="0" lang="en-US" sz="3200" b="0" i="0" u="none" strike="noStrike" kern="1200" cap="none" spc="0" normalizeH="0" baseline="0" noProof="0" dirty="0" smtClean="0">
-                <a:ln>
-                  <a:noFill/>
-                </a:ln>
+              <a:buFont typeface="Arial"/>
+              <a:buNone/>
+              <a:defRPr sz="2400" kern="1200">
                 <a:solidFill>
-                  <a:schemeClr val="tx1"/>
+                  <a:schemeClr val="tx1">
+                    <a:tint val="75000"/>
+                  </a:schemeClr>
                 </a:solidFill>
-                <a:effectLst/>
-                <a:uLnTx/>
-                <a:uFillTx/>
-                <a:latin typeface="+mj-lt"/>
-                <a:ea typeface="+mn-ea"/>
-                <a:cs typeface="Arial" pitchFamily="34" charset="0"/>
-              </a:rPr>
-              <a:t>@</a:t>
-            </a:r>
-            <a:r>
-              <a:rPr lang="en-US" sz="3200" dirty="0" err="1" smtClean="0">
-                <a:latin typeface="+mj-lt"/>
-                <a:cs typeface="Arial" pitchFamily="34" charset="0"/>
-              </a:rPr>
-              <a:t>CodingWithSpike</a:t>
-            </a:r>
-            <a:endParaRPr kumimoji="0" lang="en-US" sz="3200" b="0" i="0" u="none" strike="noStrike" kern="1200" cap="none" spc="0" normalizeH="0" baseline="0" noProof="0" dirty="0" smtClean="0">
-              <a:ln>
-                <a:noFill/>
-              </a:ln>
-              <a:solidFill>
-                <a:schemeClr val="tx1"/>
-              </a:solidFill>
-              <a:effectLst/>
-              <a:uLnTx/>
-              <a:uFillTx/>
-              <a:latin typeface="+mj-lt"/>
-              <a:ea typeface="+mn-ea"/>
-              <a:cs typeface="Arial" pitchFamily="34" charset="0"/>
-            </a:endParaRPr>
-          </a:p>
-        </p:txBody>
-      </p:sp>
-      <p:sp>
-        <p:nvSpPr>
-          <p:cNvPr id="6" name="Content Placeholder 4"/>
-          <p:cNvSpPr txBox="1">
-            <a:spLocks/>
-          </p:cNvSpPr>
-          <p:nvPr/>
-        </p:nvSpPr>
-        <p:spPr>
-          <a:xfrm>
-            <a:off x="685800" y="2800350"/>
-            <a:ext cx="3962400" cy="1485900"/>
-          </a:xfrm>
-          <a:prstGeom prst="rect">
-            <a:avLst/>
-          </a:prstGeom>
-        </p:spPr>
-        <p:txBody>
-          <a:bodyPr vert="horz">
-            <a:normAutofit fontScale="92500" lnSpcReduction="10000"/>
-          </a:bodyPr>
-          <a:lstStyle/>
-          <a:p>
-            <a:pPr marL="365760" marR="0" lvl="0" indent="-256032" algn="l" defTabSz="914400" rtl="0" eaLnBrk="1" fontAlgn="auto" latinLnBrk="0" hangingPunct="1">
-              <a:lnSpc>
-                <a:spcPct val="100000"/>
-              </a:lnSpc>
-              <a:spcBef>
-                <a:spcPts val="400"/>
-              </a:spcBef>
-              <a:spcAft>
-                <a:spcPts val="0"/>
-              </a:spcAft>
-              <a:buClr>
-                <a:schemeClr val="accent1"/>
-              </a:buClr>
-              <a:buSzPct val="68000"/>
-              <a:tabLst/>
-              <a:defRPr/>
-            </a:pPr>
-            <a:r>
-              <a:rPr kumimoji="0" lang="en-US" sz="3200" b="0" i="0" u="none" strike="noStrike" kern="1200" cap="none" spc="0" normalizeH="0" baseline="0" noProof="0" dirty="0" smtClean="0">
-                <a:ln>
-                  <a:noFill/>
-                </a:ln>
-                <a:solidFill>
-                  <a:schemeClr val="tx1"/>
-                </a:solidFill>
-                <a:effectLst/>
-                <a:uLnTx/>
-                <a:uFillTx/>
                 <a:latin typeface="+mn-lt"/>
                 <a:ea typeface="+mn-ea"/>
                 <a:cs typeface="+mn-cs"/>
-              </a:rPr>
-              <a:t>Brendan Enrick</a:t>
-            </a:r>
-          </a:p>
-          <a:p>
-            <a:pPr marL="365760" marR="0" lvl="0" indent="-256032" algn="l" defTabSz="914400" rtl="0" eaLnBrk="1" fontAlgn="auto" latinLnBrk="0" hangingPunct="1">
-              <a:lnSpc>
-                <a:spcPct val="100000"/>
-              </a:lnSpc>
+              </a:defRPr>
+            </a:lvl3pPr>
+            <a:lvl4pPr marL="1371600" indent="0" algn="ctr" defTabSz="457200" rtl="0" eaLnBrk="1" latinLnBrk="0" hangingPunct="1">
               <a:spcBef>
-                <a:spcPts val="400"/>
+                <a:spcPct val="20000"/>
               </a:spcBef>
-              <a:spcAft>
-                <a:spcPts val="0"/>
-              </a:spcAft>
-              <a:buClr>
-                <a:schemeClr val="accent1"/>
-              </a:buClr>
-              <a:buSzPct val="68000"/>
-              <a:tabLst/>
-              <a:defRPr/>
-            </a:pPr>
-            <a:r>
-              <a:rPr kumimoji="0" lang="en-US" sz="3200" b="0" i="0" u="none" strike="noStrike" kern="1200" cap="none" spc="0" normalizeH="0" baseline="0" noProof="0" dirty="0" smtClean="0">
-                <a:ln>
-                  <a:noFill/>
-                </a:ln>
+              <a:buFont typeface="Arial"/>
+              <a:buNone/>
+              <a:defRPr sz="2000" kern="1200">
                 <a:solidFill>
-                  <a:schemeClr val="tx1"/>
+                  <a:schemeClr val="tx1">
+                    <a:tint val="75000"/>
+                  </a:schemeClr>
                 </a:solidFill>
-                <a:effectLst/>
-                <a:uLnTx/>
-                <a:uFillTx/>
                 <a:latin typeface="+mn-lt"/>
                 <a:ea typeface="+mn-ea"/>
                 <a:cs typeface="+mn-cs"/>
-              </a:rPr>
-              <a:t>Brendan.Enrick.com</a:t>
-            </a:r>
-          </a:p>
-          <a:p>
-            <a:pPr marL="365760" marR="0" lvl="0" indent="-256032" algn="l" defTabSz="914400" rtl="0" eaLnBrk="1" fontAlgn="auto" latinLnBrk="0" hangingPunct="1">
-              <a:lnSpc>
-                <a:spcPct val="100000"/>
-              </a:lnSpc>
+              </a:defRPr>
+            </a:lvl4pPr>
+            <a:lvl5pPr marL="1828800" indent="0" algn="ctr" defTabSz="457200" rtl="0" eaLnBrk="1" latinLnBrk="0" hangingPunct="1">
               <a:spcBef>
-                <a:spcPts val="400"/>
+                <a:spcPct val="20000"/>
               </a:spcBef>
-              <a:spcAft>
-                <a:spcPts val="0"/>
-              </a:spcAft>
-              <a:buClr>
-                <a:schemeClr val="accent1"/>
-              </a:buClr>
-              <a:buSzPct val="68000"/>
-              <a:tabLst/>
+              <a:buFont typeface="Arial"/>
+              <a:buNone/>
+              <a:defRPr sz="2000" kern="1200">
+                <a:solidFill>
+                  <a:schemeClr val="tx1">
+                    <a:tint val="75000"/>
+                  </a:schemeClr>
+                </a:solidFill>
+                <a:latin typeface="+mn-lt"/>
+                <a:ea typeface="+mn-ea"/>
+                <a:cs typeface="+mn-cs"/>
+              </a:defRPr>
+            </a:lvl5pPr>
+            <a:lvl6pPr marL="2286000" indent="0" algn="ctr" defTabSz="457200" rtl="0" eaLnBrk="1" latinLnBrk="0" hangingPunct="1">
+              <a:spcBef>
+                <a:spcPct val="20000"/>
+              </a:spcBef>
+              <a:buFont typeface="Arial"/>
+              <a:buNone/>
+              <a:defRPr sz="2000" kern="1200">
+                <a:solidFill>
+                  <a:schemeClr val="tx1">
+                    <a:tint val="75000"/>
+                  </a:schemeClr>
+                </a:solidFill>
+                <a:latin typeface="+mn-lt"/>
+                <a:ea typeface="+mn-ea"/>
+                <a:cs typeface="+mn-cs"/>
+              </a:defRPr>
+            </a:lvl6pPr>
+            <a:lvl7pPr marL="2743200" indent="0" algn="ctr" defTabSz="457200" rtl="0" eaLnBrk="1" latinLnBrk="0" hangingPunct="1">
+              <a:spcBef>
+                <a:spcPct val="20000"/>
+              </a:spcBef>
+              <a:buFont typeface="Arial"/>
+              <a:buNone/>
+              <a:defRPr sz="2000" kern="1200">
+                <a:solidFill>
+                  <a:schemeClr val="tx1">
+                    <a:tint val="75000"/>
+                  </a:schemeClr>
+                </a:solidFill>
+                <a:latin typeface="+mn-lt"/>
+                <a:ea typeface="+mn-ea"/>
+                <a:cs typeface="+mn-cs"/>
+              </a:defRPr>
+            </a:lvl7pPr>
+            <a:lvl8pPr marL="3200400" indent="0" algn="ctr" defTabSz="457200" rtl="0" eaLnBrk="1" latinLnBrk="0" hangingPunct="1">
+              <a:spcBef>
+                <a:spcPct val="20000"/>
+              </a:spcBef>
+              <a:buFont typeface="Arial"/>
+              <a:buNone/>
+              <a:defRPr sz="2000" kern="1200">
+                <a:solidFill>
+                  <a:schemeClr val="tx1">
+                    <a:tint val="75000"/>
+                  </a:schemeClr>
+                </a:solidFill>
+                <a:latin typeface="+mn-lt"/>
+                <a:ea typeface="+mn-ea"/>
+                <a:cs typeface="+mn-cs"/>
+              </a:defRPr>
+            </a:lvl8pPr>
+            <a:lvl9pPr marL="3657600" indent="0" algn="ctr" defTabSz="457200" rtl="0" eaLnBrk="1" latinLnBrk="0" hangingPunct="1">
+              <a:spcBef>
+                <a:spcPct val="20000"/>
+              </a:spcBef>
+              <a:buFont typeface="Arial"/>
+              <a:buNone/>
+              <a:defRPr sz="2000" kern="1200">
+                <a:solidFill>
+                  <a:schemeClr val="tx1">
+                    <a:tint val="75000"/>
+                  </a:schemeClr>
+                </a:solidFill>
+                <a:latin typeface="+mn-lt"/>
+                <a:ea typeface="+mn-ea"/>
+                <a:cs typeface="+mn-cs"/>
+              </a:defRPr>
+            </a:lvl9pPr>
+          </a:lstStyle>
+          <a:p>
+            <a:pPr>
               <a:defRPr/>
             </a:pPr>
             <a:r>
-              <a:rPr lang="en-US" sz="3200" dirty="0" smtClean="0"/>
-              <a:t>@</a:t>
-            </a:r>
-            <a:r>
-              <a:rPr lang="en-US" sz="3200" dirty="0" err="1"/>
-              <a:t>b</a:t>
-            </a:r>
-            <a:r>
-              <a:rPr lang="en-US" sz="3200" dirty="0" err="1" smtClean="0"/>
-              <a:t>rendoneus</a:t>
-            </a:r>
-            <a:endParaRPr kumimoji="0" lang="en-US" sz="3200" b="0" i="0" u="none" strike="noStrike" kern="1200" cap="none" spc="0" normalizeH="0" baseline="0" noProof="0" dirty="0" smtClean="0">
-              <a:ln>
-                <a:noFill/>
-              </a:ln>
-              <a:solidFill>
-                <a:schemeClr val="tx1"/>
-              </a:solidFill>
-              <a:effectLst/>
-              <a:uLnTx/>
-              <a:uFillTx/>
-              <a:latin typeface="+mn-lt"/>
-              <a:ea typeface="+mn-ea"/>
-              <a:cs typeface="+mn-cs"/>
+              <a:rPr lang="en-US" dirty="0" smtClean="0">
+                <a:latin typeface="News Gothic Com Thin" charset="0"/>
+              </a:rPr>
+              <a:t>Jeff </a:t>
+            </a:r>
+            <a:r>
+              <a:rPr lang="en-US" dirty="0" err="1" smtClean="0">
+                <a:latin typeface="News Gothic Com Thin" charset="0"/>
+              </a:rPr>
+              <a:t>Valore</a:t>
+            </a:r>
+            <a:r>
+              <a:rPr lang="en-US" dirty="0" smtClean="0">
+                <a:latin typeface="News Gothic Com Thin" charset="0"/>
+              </a:rPr>
+              <a:t> | @</a:t>
+            </a:r>
+            <a:r>
+              <a:rPr lang="en-US" dirty="0" err="1" smtClean="0">
+                <a:latin typeface="News Gothic Com Thin" charset="0"/>
+              </a:rPr>
+              <a:t>CodingWithSpike</a:t>
+            </a:r>
+            <a:endParaRPr lang="en-US" dirty="0">
+              <a:latin typeface="News Gothic Com Thin" charset="0"/>
             </a:endParaRPr>
           </a:p>
         </p:txBody>
       </p:sp>
     </p:spTree>
+    <p:extLst>
+      <p:ext uri="{BB962C8B-B14F-4D97-AF65-F5344CB8AC3E}">
+        <p14:creationId xmlns:p14="http://schemas.microsoft.com/office/powerpoint/2010/main" val="3135247288"/>
+      </p:ext>
+    </p:extLst>
   </p:cSld>
   <p:clrMapOvr>
     <a:masterClrMapping/>
   </p:clrMapOvr>
+  <p:transition spd="slow">
+    <p:push/>
+  </p:transition>
   <p:timing>
     <p:tnLst>
       <p:par>

</xml_diff>

<commit_message>
Author Contact Slide Added
</commit_message>
<xml_diff>
--- a/00-Software Craftsmanship.pptx
+++ b/00-Software Craftsmanship.pptx
@@ -5,7 +5,7 @@
     <p:sldMasterId id="2147483661" r:id="rId1"/>
   </p:sldMasterIdLst>
   <p:notesMasterIdLst>
-    <p:notesMasterId r:id="rId16"/>
+    <p:notesMasterId r:id="rId17"/>
   </p:notesMasterIdLst>
   <p:sldIdLst>
     <p:sldId id="284" r:id="rId2"/>
@@ -22,6 +22,7 @@
     <p:sldId id="281" r:id="rId13"/>
     <p:sldId id="274" r:id="rId14"/>
     <p:sldId id="271" r:id="rId15"/>
+    <p:sldId id="285" r:id="rId16"/>
   </p:sldIdLst>
   <p:sldSz cx="9144000" cy="5143500" type="screen16x9"/>
   <p:notesSz cx="6858000" cy="9144000"/>
@@ -541,7 +542,7 @@
           </a:ln>
           <a:extLst>
             <a:ext uri="{909E8E84-426E-40dd-AFC4-6F175D3DCCD1}">
-              <a14:hiddenFill xmlns="" xmlns:a14="http://schemas.microsoft.com/office/drawing/2010/main">
+              <a14:hiddenFill xmlns:a14="http://schemas.microsoft.com/office/drawing/2010/main" xmlns="">
                 <a:solidFill>
                   <a:srgbClr val="FFFFFF"/>
                 </a:solidFill>
@@ -564,14 +565,14 @@
           <a:noFill/>
           <a:extLst>
             <a:ext uri="{909E8E84-426E-40dd-AFC4-6F175D3DCCD1}">
-              <a14:hiddenFill xmlns="" xmlns:a14="http://schemas.microsoft.com/office/drawing/2010/main">
+              <a14:hiddenFill xmlns:a14="http://schemas.microsoft.com/office/drawing/2010/main" xmlns="">
                 <a:solidFill>
                   <a:srgbClr val="FFFFFF"/>
                 </a:solidFill>
               </a14:hiddenFill>
             </a:ext>
             <a:ext uri="{91240B29-F687-4f45-9708-019B960494DF}">
-              <a14:hiddenLine xmlns="" xmlns:a14="http://schemas.microsoft.com/office/drawing/2010/main" w="9525">
+              <a14:hiddenLine xmlns:a14="http://schemas.microsoft.com/office/drawing/2010/main" xmlns="" w="9525">
                 <a:solidFill>
                   <a:srgbClr val="000000"/>
                 </a:solidFill>
@@ -609,14 +610,14 @@
           <a:noFill/>
           <a:extLst>
             <a:ext uri="{909E8E84-426E-40dd-AFC4-6F175D3DCCD1}">
-              <a14:hiddenFill xmlns="" xmlns:a14="http://schemas.microsoft.com/office/drawing/2010/main">
+              <a14:hiddenFill xmlns:a14="http://schemas.microsoft.com/office/drawing/2010/main" xmlns="">
                 <a:solidFill>
                   <a:srgbClr val="FFFFFF"/>
                 </a:solidFill>
               </a14:hiddenFill>
             </a:ext>
             <a:ext uri="{91240B29-F687-4f45-9708-019B960494DF}">
-              <a14:hiddenLine xmlns="" xmlns:a14="http://schemas.microsoft.com/office/drawing/2010/main" w="9525">
+              <a14:hiddenLine xmlns:a14="http://schemas.microsoft.com/office/drawing/2010/main" xmlns="" w="9525">
                 <a:solidFill>
                   <a:srgbClr val="000000"/>
                 </a:solidFill>
@@ -1082,6 +1083,176 @@
     <p:extLst>
       <p:ext uri="{BB962C8B-B14F-4D97-AF65-F5344CB8AC3E}">
         <p14:creationId xmlns:p14="http://schemas.microsoft.com/office/powerpoint/2010/main" val="3991169646"/>
+      </p:ext>
+    </p:extLst>
+  </p:cSld>
+  <p:clrMapOvr>
+    <a:masterClrMapping/>
+  </p:clrMapOvr>
+</p:notes>
+</file>
+
+<file path=ppt/notesSlides/notesSlide5.xml><?xml version="1.0" encoding="utf-8"?>
+<p:notes xmlns:a="http://schemas.openxmlformats.org/drawingml/2006/main" xmlns:r="http://schemas.openxmlformats.org/officeDocument/2006/relationships" xmlns:p="http://schemas.openxmlformats.org/presentationml/2006/main">
+  <p:cSld>
+    <p:spTree>
+      <p:nvGrpSpPr>
+        <p:cNvPr id="1" name=""/>
+        <p:cNvGrpSpPr/>
+        <p:nvPr/>
+      </p:nvGrpSpPr>
+      <p:grpSpPr>
+        <a:xfrm>
+          <a:off x="0" y="0"/>
+          <a:ext cx="0" cy="0"/>
+          <a:chOff x="0" y="0"/>
+          <a:chExt cx="0" cy="0"/>
+        </a:xfrm>
+      </p:grpSpPr>
+      <p:sp>
+        <p:nvSpPr>
+          <p:cNvPr id="2" name="Slide Image Placeholder 1"/>
+          <p:cNvSpPr>
+            <a:spLocks noGrp="1" noRot="1" noChangeAspect="1"/>
+          </p:cNvSpPr>
+          <p:nvPr>
+            <p:ph type="sldImg"/>
+          </p:nvPr>
+        </p:nvSpPr>
+        <p:spPr/>
+      </p:sp>
+      <p:sp>
+        <p:nvSpPr>
+          <p:cNvPr id="3" name="Notes Placeholder 2"/>
+          <p:cNvSpPr>
+            <a:spLocks noGrp="1"/>
+          </p:cNvSpPr>
+          <p:nvPr>
+            <p:ph type="body" idx="1"/>
+          </p:nvPr>
+        </p:nvSpPr>
+        <p:spPr/>
+        <p:txBody>
+          <a:bodyPr/>
+          <a:lstStyle/>
+          <a:p>
+            <a:endParaRPr lang="en-US" dirty="0"/>
+          </a:p>
+        </p:txBody>
+      </p:sp>
+      <p:sp>
+        <p:nvSpPr>
+          <p:cNvPr id="4" name="Slide Number Placeholder 3"/>
+          <p:cNvSpPr>
+            <a:spLocks noGrp="1"/>
+          </p:cNvSpPr>
+          <p:nvPr>
+            <p:ph type="sldNum" sz="quarter" idx="10"/>
+          </p:nvPr>
+        </p:nvSpPr>
+        <p:spPr/>
+        <p:txBody>
+          <a:bodyPr/>
+          <a:lstStyle/>
+          <a:p>
+            <a:fld id="{B58A8F46-A98F-42F5-B8A6-DC332A07CAEB}" type="slidenum">
+              <a:rPr lang="en-US" smtClean="0"/>
+              <a:pPr/>
+              <a:t>14</a:t>
+            </a:fld>
+            <a:endParaRPr lang="en-US"/>
+          </a:p>
+        </p:txBody>
+      </p:sp>
+    </p:spTree>
+    <p:extLst>
+      <p:ext uri="{BB962C8B-B14F-4D97-AF65-F5344CB8AC3E}">
+        <p14:creationId xmlns:p14="http://schemas.microsoft.com/office/powerpoint/2010/main" val="1286225433"/>
+      </p:ext>
+    </p:extLst>
+  </p:cSld>
+  <p:clrMapOvr>
+    <a:masterClrMapping/>
+  </p:clrMapOvr>
+</p:notes>
+</file>
+
+<file path=ppt/notesSlides/notesSlide6.xml><?xml version="1.0" encoding="utf-8"?>
+<p:notes xmlns:a="http://schemas.openxmlformats.org/drawingml/2006/main" xmlns:r="http://schemas.openxmlformats.org/officeDocument/2006/relationships" xmlns:p="http://schemas.openxmlformats.org/presentationml/2006/main">
+  <p:cSld>
+    <p:spTree>
+      <p:nvGrpSpPr>
+        <p:cNvPr id="1" name=""/>
+        <p:cNvGrpSpPr/>
+        <p:nvPr/>
+      </p:nvGrpSpPr>
+      <p:grpSpPr>
+        <a:xfrm>
+          <a:off x="0" y="0"/>
+          <a:ext cx="0" cy="0"/>
+          <a:chOff x="0" y="0"/>
+          <a:chExt cx="0" cy="0"/>
+        </a:xfrm>
+      </p:grpSpPr>
+      <p:sp>
+        <p:nvSpPr>
+          <p:cNvPr id="2" name="Slide Image Placeholder 1"/>
+          <p:cNvSpPr>
+            <a:spLocks noGrp="1" noRot="1" noChangeAspect="1"/>
+          </p:cNvSpPr>
+          <p:nvPr>
+            <p:ph type="sldImg"/>
+          </p:nvPr>
+        </p:nvSpPr>
+        <p:spPr/>
+      </p:sp>
+      <p:sp>
+        <p:nvSpPr>
+          <p:cNvPr id="3" name="Notes Placeholder 2"/>
+          <p:cNvSpPr>
+            <a:spLocks noGrp="1"/>
+          </p:cNvSpPr>
+          <p:nvPr>
+            <p:ph type="body" idx="1"/>
+          </p:nvPr>
+        </p:nvSpPr>
+        <p:spPr/>
+        <p:txBody>
+          <a:bodyPr/>
+          <a:lstStyle/>
+          <a:p>
+            <a:endParaRPr lang="en-US" dirty="0"/>
+          </a:p>
+        </p:txBody>
+      </p:sp>
+      <p:sp>
+        <p:nvSpPr>
+          <p:cNvPr id="4" name="Slide Number Placeholder 3"/>
+          <p:cNvSpPr>
+            <a:spLocks noGrp="1"/>
+          </p:cNvSpPr>
+          <p:nvPr>
+            <p:ph type="sldNum" sz="quarter" idx="10"/>
+          </p:nvPr>
+        </p:nvSpPr>
+        <p:spPr/>
+        <p:txBody>
+          <a:bodyPr/>
+          <a:lstStyle/>
+          <a:p>
+            <a:fld id="{B58A8F46-A98F-42F5-B8A6-DC332A07CAEB}" type="slidenum">
+              <a:rPr lang="en-US" smtClean="0"/>
+              <a:pPr/>
+              <a:t>15</a:t>
+            </a:fld>
+            <a:endParaRPr lang="en-US"/>
+          </a:p>
+        </p:txBody>
+      </p:sp>
+    </p:spTree>
+    <p:extLst>
+      <p:ext uri="{BB962C8B-B14F-4D97-AF65-F5344CB8AC3E}">
+        <p14:creationId xmlns:p14="http://schemas.microsoft.com/office/powerpoint/2010/main" val="3580096316"/>
       </p:ext>
     </p:extLst>
   </p:cSld>
@@ -4523,6 +4694,13 @@
   <p:clrMapOvr>
     <a:masterClrMapping/>
   </p:clrMapOvr>
+  <p:timing>
+    <p:tnLst>
+      <p:par>
+        <p:cTn id="1" dur="indefinite" restart="never" nodeType="tmRoot"/>
+      </p:par>
+    </p:tnLst>
+  </p:timing>
 </p:sld>
 </file>
 
@@ -4607,6 +4785,13 @@
   <p:clrMapOvr>
     <a:masterClrMapping/>
   </p:clrMapOvr>
+  <p:timing>
+    <p:tnLst>
+      <p:par>
+        <p:cTn id="1" dur="indefinite" restart="never" nodeType="tmRoot"/>
+      </p:par>
+    </p:tnLst>
+  </p:timing>
 </p:sld>
 </file>
 
@@ -4691,6 +4876,13 @@
   <p:clrMapOvr>
     <a:masterClrMapping/>
   </p:clrMapOvr>
+  <p:timing>
+    <p:tnLst>
+      <p:par>
+        <p:cTn id="1" dur="indefinite" restart="never" nodeType="tmRoot"/>
+      </p:par>
+    </p:tnLst>
+  </p:timing>
 </p:sld>
 </file>
 
@@ -4781,6 +4973,13 @@
   <p:clrMapOvr>
     <a:masterClrMapping/>
   </p:clrMapOvr>
+  <p:timing>
+    <p:tnLst>
+      <p:par>
+        <p:cTn id="1" dur="indefinite" restart="never" nodeType="tmRoot"/>
+      </p:par>
+    </p:tnLst>
+  </p:timing>
 </p:sld>
 </file>
 
@@ -4908,6 +5107,229 @@
         </p:txBody>
       </p:sp>
     </p:spTree>
+  </p:cSld>
+  <p:clrMapOvr>
+    <a:masterClrMapping/>
+  </p:clrMapOvr>
+  <p:timing>
+    <p:tnLst>
+      <p:par>
+        <p:cTn id="1" dur="indefinite" restart="never" nodeType="tmRoot"/>
+      </p:par>
+    </p:tnLst>
+  </p:timing>
+</p:sld>
+</file>
+
+<file path=ppt/slides/slide15.xml><?xml version="1.0" encoding="utf-8"?>
+<p:sld xmlns:a="http://schemas.openxmlformats.org/drawingml/2006/main" xmlns:r="http://schemas.openxmlformats.org/officeDocument/2006/relationships" xmlns:p="http://schemas.openxmlformats.org/presentationml/2006/main">
+  <p:cSld>
+    <p:spTree>
+      <p:nvGrpSpPr>
+        <p:cNvPr id="1" name=""/>
+        <p:cNvGrpSpPr/>
+        <p:nvPr/>
+      </p:nvGrpSpPr>
+      <p:grpSpPr>
+        <a:xfrm>
+          <a:off x="0" y="0"/>
+          <a:ext cx="0" cy="0"/>
+          <a:chOff x="0" y="0"/>
+          <a:chExt cx="0" cy="0"/>
+        </a:xfrm>
+      </p:grpSpPr>
+      <p:sp>
+        <p:nvSpPr>
+          <p:cNvPr id="2" name="Title 1"/>
+          <p:cNvSpPr>
+            <a:spLocks noGrp="1"/>
+          </p:cNvSpPr>
+          <p:nvPr>
+            <p:ph type="title"/>
+          </p:nvPr>
+        </p:nvSpPr>
+        <p:spPr/>
+        <p:txBody>
+          <a:bodyPr/>
+          <a:lstStyle/>
+          <a:p>
+            <a:r>
+              <a:rPr lang="en-US" dirty="0" smtClean="0"/>
+              <a:t>Speaker Contact Info</a:t>
+            </a:r>
+            <a:endParaRPr lang="en-US" dirty="0"/>
+          </a:p>
+        </p:txBody>
+      </p:sp>
+      <p:sp>
+        <p:nvSpPr>
+          <p:cNvPr id="3" name="Content Placeholder 2"/>
+          <p:cNvSpPr>
+            <a:spLocks noGrp="1"/>
+          </p:cNvSpPr>
+          <p:nvPr>
+            <p:ph sz="half" idx="1"/>
+          </p:nvPr>
+        </p:nvSpPr>
+        <p:spPr>
+          <a:xfrm>
+            <a:off x="457200" y="1200151"/>
+            <a:ext cx="4038600" cy="1676399"/>
+          </a:xfrm>
+        </p:spPr>
+        <p:txBody>
+          <a:bodyPr/>
+          <a:lstStyle/>
+          <a:p>
+            <a:pPr marL="0" indent="0">
+              <a:buNone/>
+            </a:pPr>
+            <a:r>
+              <a:rPr lang="en-US" dirty="0" smtClean="0"/>
+              <a:t>Brendan Enrick</a:t>
+            </a:r>
+          </a:p>
+          <a:p>
+            <a:r>
+              <a:rPr lang="en-US" dirty="0" smtClean="0"/>
+              <a:t>Brendan.Enrick.com</a:t>
+            </a:r>
+          </a:p>
+          <a:p>
+            <a:r>
+              <a:rPr lang="en-US" dirty="0" smtClean="0"/>
+              <a:t>@BRENDONEUS</a:t>
+            </a:r>
+            <a:endParaRPr lang="en-US" dirty="0"/>
+          </a:p>
+        </p:txBody>
+      </p:sp>
+      <p:sp>
+        <p:nvSpPr>
+          <p:cNvPr id="4" name="Content Placeholder 3"/>
+          <p:cNvSpPr>
+            <a:spLocks noGrp="1"/>
+          </p:cNvSpPr>
+          <p:nvPr>
+            <p:ph sz="half" idx="2"/>
+          </p:nvPr>
+        </p:nvSpPr>
+        <p:spPr>
+          <a:xfrm>
+            <a:off x="4648200" y="1200151"/>
+            <a:ext cx="4038600" cy="1676399"/>
+          </a:xfrm>
+        </p:spPr>
+        <p:txBody>
+          <a:bodyPr/>
+          <a:lstStyle/>
+          <a:p>
+            <a:pPr marL="0" indent="0">
+              <a:buNone/>
+            </a:pPr>
+            <a:r>
+              <a:rPr lang="en-US" dirty="0" smtClean="0"/>
+              <a:t>Jeff </a:t>
+            </a:r>
+            <a:r>
+              <a:rPr lang="en-US" dirty="0" err="1" smtClean="0"/>
+              <a:t>Valore</a:t>
+            </a:r>
+            <a:endParaRPr lang="en-US" dirty="0" smtClean="0"/>
+          </a:p>
+          <a:p>
+            <a:r>
+              <a:rPr lang="en-US" dirty="0" smtClean="0"/>
+              <a:t>@</a:t>
+            </a:r>
+            <a:r>
+              <a:rPr lang="en-US" dirty="0" err="1" smtClean="0"/>
+              <a:t>CodingWithSpike</a:t>
+            </a:r>
+            <a:endParaRPr lang="en-US" dirty="0"/>
+          </a:p>
+        </p:txBody>
+      </p:sp>
+      <p:sp>
+        <p:nvSpPr>
+          <p:cNvPr id="5" name="TextBox 4"/>
+          <p:cNvSpPr txBox="1"/>
+          <p:nvPr/>
+        </p:nvSpPr>
+        <p:spPr>
+          <a:xfrm>
+            <a:off x="2111493" y="3257550"/>
+            <a:ext cx="4768613" cy="1200329"/>
+          </a:xfrm>
+          <a:prstGeom prst="rect">
+            <a:avLst/>
+          </a:prstGeom>
+          <a:noFill/>
+        </p:spPr>
+        <p:txBody>
+          <a:bodyPr wrap="none" rtlCol="0">
+            <a:spAutoFit/>
+          </a:bodyPr>
+          <a:lstStyle/>
+          <a:p>
+            <a:r>
+              <a:rPr lang="en-US" dirty="0" smtClean="0"/>
+              <a:t>Slides will be posted on:</a:t>
+            </a:r>
+          </a:p>
+          <a:p>
+            <a:pPr marL="285750" indent="-285750">
+              <a:buFont typeface="Arial" panose="020B0604020202020204" pitchFamily="34" charset="0"/>
+              <a:buChar char="•"/>
+            </a:pPr>
+            <a:r>
+              <a:rPr lang="en-US" dirty="0" smtClean="0">
+                <a:hlinkClick r:id="rId3"/>
+              </a:rPr>
+              <a:t>http://Brendan.Enrick.com/</a:t>
+            </a:r>
+            <a:endParaRPr lang="en-US" dirty="0" smtClean="0"/>
+          </a:p>
+          <a:p>
+            <a:pPr marL="285750" indent="-285750">
+              <a:buFont typeface="Arial" panose="020B0604020202020204" pitchFamily="34" charset="0"/>
+              <a:buChar char="•"/>
+            </a:pPr>
+            <a:r>
+              <a:rPr lang="en-US" dirty="0">
+                <a:hlinkClick r:id="rId4"/>
+              </a:rPr>
+              <a:t>https://</a:t>
+            </a:r>
+            <a:r>
+              <a:rPr lang="en-US" dirty="0" smtClean="0">
+                <a:hlinkClick r:id="rId4"/>
+              </a:rPr>
+              <a:t>github.com/TechConf/CodeMash2015</a:t>
+            </a:r>
+            <a:endParaRPr lang="en-US" dirty="0" smtClean="0"/>
+          </a:p>
+          <a:p>
+            <a:pPr marL="285750" indent="-285750">
+              <a:buFont typeface="Arial" panose="020B0604020202020204" pitchFamily="34" charset="0"/>
+              <a:buChar char="•"/>
+            </a:pPr>
+            <a:r>
+              <a:rPr lang="en-US" dirty="0" smtClean="0">
+                <a:hlinkClick r:id="rId5"/>
+              </a:rPr>
+              <a:t>http://HudsonSC.com/</a:t>
+            </a:r>
+            <a:endParaRPr lang="en-US" dirty="0" smtClean="0"/>
+          </a:p>
+        </p:txBody>
+      </p:sp>
+    </p:spTree>
+    <p:extLst>
+      <p:ext uri="{BB962C8B-B14F-4D97-AF65-F5344CB8AC3E}">
+        <p14:creationId xmlns:p14="http://schemas.microsoft.com/office/powerpoint/2010/main" val="3531253304"/>
+      </p:ext>
+    </p:extLst>
   </p:cSld>
   <p:clrMapOvr>
     <a:masterClrMapping/>
@@ -5110,13 +5532,11 @@
           <a:p>
             <a:r>
               <a:rPr lang="en-US" dirty="0" smtClean="0"/>
-              <a:t>Agile++</a:t>
-            </a:r>
-          </a:p>
-          <a:p>
+              <a:t>Practice</a:t>
+            </a:r>
             <a:r>
               <a:rPr lang="en-US" dirty="0" smtClean="0"/>
-              <a:t>Practice, teach, and learn so that we can steadily add value to well-crafted software, promote a strong community of professionals, and partner closely with others. </a:t>
+              <a:t>, teach, and learn so that we can steadily add value to well-crafted software, promote a strong community of professionals, and partner closely with others. </a:t>
             </a:r>
           </a:p>
           <a:p>
@@ -5209,8 +5629,8 @@
         </p:blipFill>
         <p:spPr bwMode="auto">
           <a:xfrm>
-            <a:off x="1905000" y="1543050"/>
-            <a:ext cx="5559218" cy="4244579"/>
+            <a:off x="2423567" y="1714500"/>
+            <a:ext cx="4296865" cy="3280746"/>
           </a:xfrm>
           <a:prstGeom prst="rect">
             <a:avLst/>
@@ -5523,6 +5943,13 @@
   <p:clrMapOvr>
     <a:masterClrMapping/>
   </p:clrMapOvr>
+  <p:timing>
+    <p:tnLst>
+      <p:par>
+        <p:cTn id="1" dur="indefinite" restart="never" nodeType="tmRoot"/>
+      </p:par>
+    </p:tnLst>
+  </p:timing>
 </p:sld>
 </file>
 

</xml_diff>